<commit_message>
initial commit for calc_jaccard
</commit_message>
<xml_diff>
--- a/LongReadAssembler.pptx
+++ b/LongReadAssembler.pptx
@@ -5,13 +5,14 @@
     <p:sldMasterId id="2147483648" r:id="rId1"/>
   </p:sldMasterIdLst>
   <p:notesMasterIdLst>
-    <p:notesMasterId r:id="rId6"/>
+    <p:notesMasterId r:id="rId7"/>
   </p:notesMasterIdLst>
   <p:sldIdLst>
     <p:sldId id="257" r:id="rId2"/>
     <p:sldId id="258" r:id="rId3"/>
     <p:sldId id="259" r:id="rId4"/>
     <p:sldId id="260" r:id="rId5"/>
+    <p:sldId id="261" r:id="rId6"/>
   </p:sldIdLst>
   <p:sldSz cx="12192000" cy="6858000"/>
   <p:notesSz cx="6858000" cy="9144000"/>
@@ -195,7 +196,7 @@
           <a:p>
             <a:fld id="{FFFDC498-172C-B84E-81F2-CE997728B55C}" type="datetimeFigureOut">
               <a:rPr lang="en-US" smtClean="0"/>
-              <a:t>5/22/17</a:t>
+              <a:t>5/23/17</a:t>
             </a:fld>
             <a:endParaRPr lang="en-US"/>
           </a:p>
@@ -631,174 +632,6 @@
 </p:notes>
 </file>
 
-<file path=ppt/notesSlides/notesSlide3.xml><?xml version="1.0" encoding="utf-8"?>
-<p:notes xmlns:a="http://schemas.openxmlformats.org/drawingml/2006/main" xmlns:r="http://schemas.openxmlformats.org/officeDocument/2006/relationships" xmlns:p="http://schemas.openxmlformats.org/presentationml/2006/main">
-  <p:cSld>
-    <p:spTree>
-      <p:nvGrpSpPr>
-        <p:cNvPr id="1" name=""/>
-        <p:cNvGrpSpPr/>
-        <p:nvPr/>
-      </p:nvGrpSpPr>
-      <p:grpSpPr>
-        <a:xfrm>
-          <a:off x="0" y="0"/>
-          <a:ext cx="0" cy="0"/>
-          <a:chOff x="0" y="0"/>
-          <a:chExt cx="0" cy="0"/>
-        </a:xfrm>
-      </p:grpSpPr>
-      <p:sp>
-        <p:nvSpPr>
-          <p:cNvPr id="2" name="Slide Image Placeholder 1"/>
-          <p:cNvSpPr>
-            <a:spLocks noGrp="1" noRot="1" noChangeAspect="1"/>
-          </p:cNvSpPr>
-          <p:nvPr>
-            <p:ph type="sldImg"/>
-          </p:nvPr>
-        </p:nvSpPr>
-        <p:spPr/>
-      </p:sp>
-      <p:sp>
-        <p:nvSpPr>
-          <p:cNvPr id="3" name="Notes Placeholder 2"/>
-          <p:cNvSpPr>
-            <a:spLocks noGrp="1"/>
-          </p:cNvSpPr>
-          <p:nvPr>
-            <p:ph type="body" idx="1"/>
-          </p:nvPr>
-        </p:nvSpPr>
-        <p:spPr/>
-        <p:txBody>
-          <a:bodyPr/>
-          <a:lstStyle/>
-          <a:p>
-            <a:endParaRPr lang="en-US" dirty="0"/>
-          </a:p>
-        </p:txBody>
-      </p:sp>
-      <p:sp>
-        <p:nvSpPr>
-          <p:cNvPr id="4" name="Slide Number Placeholder 3"/>
-          <p:cNvSpPr>
-            <a:spLocks noGrp="1"/>
-          </p:cNvSpPr>
-          <p:nvPr>
-            <p:ph type="sldNum" sz="quarter" idx="10"/>
-          </p:nvPr>
-        </p:nvSpPr>
-        <p:spPr/>
-        <p:txBody>
-          <a:bodyPr/>
-          <a:lstStyle/>
-          <a:p>
-            <a:fld id="{9F9E6DB5-4739-194C-9481-6E2B21B9589B}" type="slidenum">
-              <a:rPr lang="en-US" smtClean="0"/>
-              <a:t>3</a:t>
-            </a:fld>
-            <a:endParaRPr lang="en-US" dirty="0"/>
-          </a:p>
-        </p:txBody>
-      </p:sp>
-    </p:spTree>
-    <p:extLst>
-      <p:ext uri="{BB962C8B-B14F-4D97-AF65-F5344CB8AC3E}">
-        <p14:creationId xmlns:p14="http://schemas.microsoft.com/office/powerpoint/2010/main" val="1367314970"/>
-      </p:ext>
-    </p:extLst>
-  </p:cSld>
-  <p:clrMapOvr>
-    <a:masterClrMapping/>
-  </p:clrMapOvr>
-</p:notes>
-</file>
-
-<file path=ppt/notesSlides/notesSlide4.xml><?xml version="1.0" encoding="utf-8"?>
-<p:notes xmlns:a="http://schemas.openxmlformats.org/drawingml/2006/main" xmlns:r="http://schemas.openxmlformats.org/officeDocument/2006/relationships" xmlns:p="http://schemas.openxmlformats.org/presentationml/2006/main">
-  <p:cSld>
-    <p:spTree>
-      <p:nvGrpSpPr>
-        <p:cNvPr id="1" name=""/>
-        <p:cNvGrpSpPr/>
-        <p:nvPr/>
-      </p:nvGrpSpPr>
-      <p:grpSpPr>
-        <a:xfrm>
-          <a:off x="0" y="0"/>
-          <a:ext cx="0" cy="0"/>
-          <a:chOff x="0" y="0"/>
-          <a:chExt cx="0" cy="0"/>
-        </a:xfrm>
-      </p:grpSpPr>
-      <p:sp>
-        <p:nvSpPr>
-          <p:cNvPr id="2" name="Slide Image Placeholder 1"/>
-          <p:cNvSpPr>
-            <a:spLocks noGrp="1" noRot="1" noChangeAspect="1"/>
-          </p:cNvSpPr>
-          <p:nvPr>
-            <p:ph type="sldImg"/>
-          </p:nvPr>
-        </p:nvSpPr>
-        <p:spPr/>
-      </p:sp>
-      <p:sp>
-        <p:nvSpPr>
-          <p:cNvPr id="3" name="Notes Placeholder 2"/>
-          <p:cNvSpPr>
-            <a:spLocks noGrp="1"/>
-          </p:cNvSpPr>
-          <p:nvPr>
-            <p:ph type="body" idx="1"/>
-          </p:nvPr>
-        </p:nvSpPr>
-        <p:spPr/>
-        <p:txBody>
-          <a:bodyPr/>
-          <a:lstStyle/>
-          <a:p>
-            <a:endParaRPr lang="en-US" dirty="0"/>
-          </a:p>
-        </p:txBody>
-      </p:sp>
-      <p:sp>
-        <p:nvSpPr>
-          <p:cNvPr id="4" name="Slide Number Placeholder 3"/>
-          <p:cNvSpPr>
-            <a:spLocks noGrp="1"/>
-          </p:cNvSpPr>
-          <p:nvPr>
-            <p:ph type="sldNum" sz="quarter" idx="10"/>
-          </p:nvPr>
-        </p:nvSpPr>
-        <p:spPr/>
-        <p:txBody>
-          <a:bodyPr/>
-          <a:lstStyle/>
-          <a:p>
-            <a:fld id="{9F9E6DB5-4739-194C-9481-6E2B21B9589B}" type="slidenum">
-              <a:rPr lang="en-US" smtClean="0"/>
-              <a:t>4</a:t>
-            </a:fld>
-            <a:endParaRPr lang="en-US" dirty="0"/>
-          </a:p>
-        </p:txBody>
-      </p:sp>
-    </p:spTree>
-    <p:extLst>
-      <p:ext uri="{BB962C8B-B14F-4D97-AF65-F5344CB8AC3E}">
-        <p14:creationId xmlns:p14="http://schemas.microsoft.com/office/powerpoint/2010/main" val="1822869388"/>
-      </p:ext>
-    </p:extLst>
-  </p:cSld>
-  <p:clrMapOvr>
-    <a:masterClrMapping/>
-  </p:clrMapOvr>
-</p:notes>
-</file>
-
 <file path=ppt/slideLayouts/slideLayout1.xml><?xml version="1.0" encoding="utf-8"?>
 <p:sldLayout xmlns:a="http://schemas.openxmlformats.org/drawingml/2006/main" xmlns:r="http://schemas.openxmlformats.org/officeDocument/2006/relationships" xmlns:p="http://schemas.openxmlformats.org/presentationml/2006/main" type="title" preserve="1">
   <p:cSld name="Title Slide">
@@ -930,7 +763,7 @@
           <a:p>
             <a:fld id="{8657ED27-75B3-924B-A762-9A1EA3791C12}" type="datetimeFigureOut">
               <a:rPr lang="en-US" smtClean="0"/>
-              <a:t>5/22/17</a:t>
+              <a:t>5/23/17</a:t>
             </a:fld>
             <a:endParaRPr lang="en-US"/>
           </a:p>
@@ -1100,7 +933,7 @@
           <a:p>
             <a:fld id="{8657ED27-75B3-924B-A762-9A1EA3791C12}" type="datetimeFigureOut">
               <a:rPr lang="en-US" smtClean="0"/>
-              <a:t>5/22/17</a:t>
+              <a:t>5/23/17</a:t>
             </a:fld>
             <a:endParaRPr lang="en-US"/>
           </a:p>
@@ -1280,7 +1113,7 @@
           <a:p>
             <a:fld id="{8657ED27-75B3-924B-A762-9A1EA3791C12}" type="datetimeFigureOut">
               <a:rPr lang="en-US" smtClean="0"/>
-              <a:t>5/22/17</a:t>
+              <a:t>5/23/17</a:t>
             </a:fld>
             <a:endParaRPr lang="en-US"/>
           </a:p>
@@ -1450,7 +1283,7 @@
           <a:p>
             <a:fld id="{8657ED27-75B3-924B-A762-9A1EA3791C12}" type="datetimeFigureOut">
               <a:rPr lang="en-US" smtClean="0"/>
-              <a:t>5/22/17</a:t>
+              <a:t>5/23/17</a:t>
             </a:fld>
             <a:endParaRPr lang="en-US"/>
           </a:p>
@@ -1696,7 +1529,7 @@
           <a:p>
             <a:fld id="{8657ED27-75B3-924B-A762-9A1EA3791C12}" type="datetimeFigureOut">
               <a:rPr lang="en-US" smtClean="0"/>
-              <a:t>5/22/17</a:t>
+              <a:t>5/23/17</a:t>
             </a:fld>
             <a:endParaRPr lang="en-US"/>
           </a:p>
@@ -1928,7 +1761,7 @@
           <a:p>
             <a:fld id="{8657ED27-75B3-924B-A762-9A1EA3791C12}" type="datetimeFigureOut">
               <a:rPr lang="en-US" smtClean="0"/>
-              <a:t>5/22/17</a:t>
+              <a:t>5/23/17</a:t>
             </a:fld>
             <a:endParaRPr lang="en-US"/>
           </a:p>
@@ -2295,7 +2128,7 @@
           <a:p>
             <a:fld id="{8657ED27-75B3-924B-A762-9A1EA3791C12}" type="datetimeFigureOut">
               <a:rPr lang="en-US" smtClean="0"/>
-              <a:t>5/22/17</a:t>
+              <a:t>5/23/17</a:t>
             </a:fld>
             <a:endParaRPr lang="en-US"/>
           </a:p>
@@ -2413,7 +2246,7 @@
           <a:p>
             <a:fld id="{8657ED27-75B3-924B-A762-9A1EA3791C12}" type="datetimeFigureOut">
               <a:rPr lang="en-US" smtClean="0"/>
-              <a:t>5/22/17</a:t>
+              <a:t>5/23/17</a:t>
             </a:fld>
             <a:endParaRPr lang="en-US"/>
           </a:p>
@@ -2508,7 +2341,7 @@
           <a:p>
             <a:fld id="{8657ED27-75B3-924B-A762-9A1EA3791C12}" type="datetimeFigureOut">
               <a:rPr lang="en-US" smtClean="0"/>
-              <a:t>5/22/17</a:t>
+              <a:t>5/23/17</a:t>
             </a:fld>
             <a:endParaRPr lang="en-US"/>
           </a:p>
@@ -2785,7 +2618,7 @@
           <a:p>
             <a:fld id="{8657ED27-75B3-924B-A762-9A1EA3791C12}" type="datetimeFigureOut">
               <a:rPr lang="en-US" smtClean="0"/>
-              <a:t>5/22/17</a:t>
+              <a:t>5/23/17</a:t>
             </a:fld>
             <a:endParaRPr lang="en-US"/>
           </a:p>
@@ -3038,7 +2871,7 @@
           <a:p>
             <a:fld id="{8657ED27-75B3-924B-A762-9A1EA3791C12}" type="datetimeFigureOut">
               <a:rPr lang="en-US" smtClean="0"/>
-              <a:t>5/22/17</a:t>
+              <a:t>5/23/17</a:t>
             </a:fld>
             <a:endParaRPr lang="en-US"/>
           </a:p>
@@ -3251,7 +3084,7 @@
           <a:p>
             <a:fld id="{8657ED27-75B3-924B-A762-9A1EA3791C12}" type="datetimeFigureOut">
               <a:rPr lang="en-US" smtClean="0"/>
-              <a:t>5/22/17</a:t>
+              <a:t>5/23/17</a:t>
             </a:fld>
             <a:endParaRPr lang="en-US"/>
           </a:p>
@@ -3687,11 +3520,6 @@
               </a:rPr>
               <a:t>Long Read Mapping and Assembly</a:t>
             </a:r>
-            <a:endParaRPr lang="en-US" sz="3200" b="1" dirty="0" smtClean="0">
-              <a:latin typeface="Times" charset="0"/>
-              <a:ea typeface="Times" charset="0"/>
-              <a:cs typeface="Times" charset="0"/>
-            </a:endParaRPr>
           </a:p>
           <a:p>
             <a:pPr algn="ctr"/>
@@ -3734,18 +3562,7 @@
                 <a:ea typeface="Times" charset="0"/>
                 <a:cs typeface="Times" charset="0"/>
               </a:rPr>
-              <a:t>, </a:t>
-            </a:r>
-            <a:r>
-              <a:rPr lang="en-US" sz="2000" dirty="0" smtClean="0">
-                <a:solidFill>
-                  <a:srgbClr val="65737E"/>
-                </a:solidFill>
-                <a:latin typeface="Times" charset="0"/>
-                <a:ea typeface="Times" charset="0"/>
-                <a:cs typeface="Times" charset="0"/>
-              </a:rPr>
-              <a:t>Eric Davis</a:t>
+              <a:t>, Eric Davis</a:t>
             </a:r>
             <a:r>
               <a:rPr lang="en-US" sz="2000" dirty="0">
@@ -3893,18 +3710,7 @@
                 <a:ea typeface="Times" charset="0"/>
                 <a:cs typeface="Times" charset="0"/>
               </a:rPr>
-              <a:t> Hackathon:              </a:t>
-            </a:r>
-            <a:r>
-              <a:rPr lang="en-US" sz="1600" dirty="0" smtClean="0">
-                <a:solidFill>
-                  <a:schemeClr val="tx1"/>
-                </a:solidFill>
-                <a:latin typeface="Times" charset="0"/>
-                <a:ea typeface="Times" charset="0"/>
-                <a:cs typeface="Times" charset="0"/>
-              </a:rPr>
-              <a:t>May</a:t>
+              <a:t> Hackathon:              May</a:t>
             </a:r>
             <a:r>
               <a:rPr lang="en-US" sz="1400" dirty="0" smtClean="0">
@@ -4033,7 +3839,7 @@
   <p:timing>
     <p:tnLst>
       <p:par>
-        <p:cTn id="1" dur="indefinite" restart="never" nodeType="tmRoot"/>
+        <p:cTn xmlns:p14="http://schemas.microsoft.com/office/powerpoint/2010/main" id="1" dur="indefinite" restart="never" nodeType="tmRoot"/>
       </p:par>
     </p:tnLst>
   </p:timing>
@@ -4059,7 +3865,87 @@
       </p:grpSpPr>
       <p:sp>
         <p:nvSpPr>
-          <p:cNvPr id="8" name="Footer Placeholder 4"/>
+          <p:cNvPr id="4" name="Title 3"/>
+          <p:cNvSpPr>
+            <a:spLocks noGrp="1"/>
+          </p:cNvSpPr>
+          <p:nvPr>
+            <p:ph type="title"/>
+          </p:nvPr>
+        </p:nvSpPr>
+        <p:spPr/>
+        <p:txBody>
+          <a:bodyPr/>
+          <a:lstStyle/>
+          <a:p>
+            <a:r>
+              <a:rPr lang="en-US" dirty="0" smtClean="0"/>
+              <a:t>Motivation</a:t>
+            </a:r>
+            <a:endParaRPr lang="en-US" dirty="0"/>
+          </a:p>
+        </p:txBody>
+      </p:sp>
+      <p:sp>
+        <p:nvSpPr>
+          <p:cNvPr id="6" name="Content Placeholder 5"/>
+          <p:cNvSpPr>
+            <a:spLocks noGrp="1"/>
+          </p:cNvSpPr>
+          <p:nvPr>
+            <p:ph idx="1"/>
+          </p:nvPr>
+        </p:nvSpPr>
+        <p:spPr/>
+        <p:txBody>
+          <a:bodyPr/>
+          <a:lstStyle/>
+          <a:p>
+            <a:r>
+              <a:rPr lang="en-US" dirty="0" smtClean="0"/>
+              <a:t>Build a fast long read comparison algorithm</a:t>
+            </a:r>
+          </a:p>
+          <a:p>
+            <a:endParaRPr lang="en-US" dirty="0" smtClean="0"/>
+          </a:p>
+          <a:p>
+            <a:r>
+              <a:rPr lang="en-US" dirty="0" smtClean="0"/>
+              <a:t>Solves long read alignment, clustering and assembly problems.</a:t>
+            </a:r>
+          </a:p>
+          <a:p>
+            <a:pPr lvl="1"/>
+            <a:r>
+              <a:rPr lang="en-US" dirty="0" smtClean="0"/>
+              <a:t>Targeted toward </a:t>
+            </a:r>
+            <a:r>
+              <a:rPr lang="en-US" dirty="0" err="1" smtClean="0"/>
+              <a:t>PacBio</a:t>
+            </a:r>
+            <a:r>
+              <a:rPr lang="en-US" dirty="0" smtClean="0"/>
+              <a:t> and Oxford </a:t>
+            </a:r>
+            <a:r>
+              <a:rPr lang="en-US" dirty="0" err="1" smtClean="0"/>
+              <a:t>Nanopore</a:t>
+            </a:r>
+            <a:r>
+              <a:rPr lang="en-US" dirty="0" smtClean="0"/>
+              <a:t> tech.</a:t>
+            </a:r>
+          </a:p>
+          <a:p>
+            <a:endParaRPr lang="en-US" dirty="0"/>
+          </a:p>
+        </p:txBody>
+      </p:sp>
+      <p:sp>
+        <p:nvSpPr>
+          <p:cNvPr id="11" name="Footer Placeholder 4"/>
           <p:cNvSpPr>
             <a:spLocks noGrp="1"/>
           </p:cNvSpPr>
@@ -4115,18 +4001,7 @@
                 <a:ea typeface="Times" charset="0"/>
                 <a:cs typeface="Times" charset="0"/>
               </a:rPr>
-              <a:t> Hackathon:              </a:t>
-            </a:r>
-            <a:r>
-              <a:rPr lang="en-US" sz="1600" dirty="0" smtClean="0">
-                <a:solidFill>
-                  <a:schemeClr val="tx1"/>
-                </a:solidFill>
-                <a:latin typeface="Times" charset="0"/>
-                <a:ea typeface="Times" charset="0"/>
-                <a:cs typeface="Times" charset="0"/>
-              </a:rPr>
-              <a:t>May</a:t>
+              <a:t> Hackathon:              May</a:t>
             </a:r>
             <a:r>
               <a:rPr lang="en-US" sz="1400" dirty="0" smtClean="0">
@@ -4207,7 +4082,7 @@
       </p:sp>
       <p:cxnSp>
         <p:nvCxnSpPr>
-          <p:cNvPr id="3" name="Straight Connector 2"/>
+          <p:cNvPr id="12" name="Straight Connector 11"/>
           <p:cNvCxnSpPr/>
           <p:nvPr/>
         </p:nvCxnSpPr>
@@ -4242,195 +4117,6 @@
           </a:fontRef>
         </p:style>
       </p:cxnSp>
-      <p:sp>
-        <p:nvSpPr>
-          <p:cNvPr id="2" name="TextBox 1"/>
-          <p:cNvSpPr txBox="1"/>
-          <p:nvPr/>
-        </p:nvSpPr>
-        <p:spPr>
-          <a:xfrm>
-            <a:off x="0" y="0"/>
-            <a:ext cx="12161520" cy="584775"/>
-          </a:xfrm>
-          <a:prstGeom prst="rect">
-            <a:avLst/>
-          </a:prstGeom>
-          <a:noFill/>
-        </p:spPr>
-        <p:txBody>
-          <a:bodyPr wrap="square" rtlCol="0">
-            <a:spAutoFit/>
-          </a:bodyPr>
-          <a:lstStyle/>
-          <a:p>
-            <a:pPr algn="ctr"/>
-            <a:r>
-              <a:rPr lang="en-US" sz="3200" dirty="0" smtClean="0">
-                <a:latin typeface="Times" charset="0"/>
-                <a:ea typeface="Times" charset="0"/>
-                <a:cs typeface="Times" charset="0"/>
-              </a:rPr>
-              <a:t>Motivation</a:t>
-            </a:r>
-            <a:endParaRPr lang="en-US" sz="3200" dirty="0">
-              <a:latin typeface="Times" charset="0"/>
-              <a:ea typeface="Times" charset="0"/>
-              <a:cs typeface="Times" charset="0"/>
-            </a:endParaRPr>
-          </a:p>
-        </p:txBody>
-      </p:sp>
-      <p:sp>
-        <p:nvSpPr>
-          <p:cNvPr id="5" name="TextBox 4"/>
-          <p:cNvSpPr txBox="1"/>
-          <p:nvPr/>
-        </p:nvSpPr>
-        <p:spPr>
-          <a:xfrm>
-            <a:off x="976393" y="1038386"/>
-            <a:ext cx="6664271" cy="369332"/>
-          </a:xfrm>
-          <a:prstGeom prst="rect">
-            <a:avLst/>
-          </a:prstGeom>
-          <a:noFill/>
-        </p:spPr>
-        <p:txBody>
-          <a:bodyPr wrap="square" rtlCol="0">
-            <a:spAutoFit/>
-          </a:bodyPr>
-          <a:lstStyle/>
-          <a:p>
-            <a:pPr marL="285750" indent="-285750">
-              <a:buFont typeface="Arial" charset="0"/>
-              <a:buChar char="•"/>
-            </a:pPr>
-            <a:r>
-              <a:rPr lang="en-US" dirty="0" smtClean="0">
-                <a:latin typeface="Times" charset="0"/>
-                <a:ea typeface="Times" charset="0"/>
-                <a:cs typeface="Times" charset="0"/>
-              </a:rPr>
-              <a:t>Resolving copy number variations (CNVs) is a </a:t>
-            </a:r>
-            <a:r>
-              <a:rPr lang="en-US" smtClean="0">
-                <a:latin typeface="Times" charset="0"/>
-                <a:ea typeface="Times" charset="0"/>
-                <a:cs typeface="Times" charset="0"/>
-              </a:rPr>
-              <a:t>hard problem</a:t>
-            </a:r>
-            <a:endParaRPr lang="en-US" dirty="0">
-              <a:latin typeface="Times" charset="0"/>
-              <a:ea typeface="Times" charset="0"/>
-              <a:cs typeface="Times" charset="0"/>
-            </a:endParaRPr>
-          </a:p>
-        </p:txBody>
-      </p:sp>
-      <p:sp>
-        <p:nvSpPr>
-          <p:cNvPr id="9" name="TextBox 8"/>
-          <p:cNvSpPr txBox="1"/>
-          <p:nvPr/>
-        </p:nvSpPr>
-        <p:spPr>
-          <a:xfrm>
-            <a:off x="976392" y="1538163"/>
-            <a:ext cx="6664271" cy="646331"/>
-          </a:xfrm>
-          <a:prstGeom prst="rect">
-            <a:avLst/>
-          </a:prstGeom>
-          <a:noFill/>
-        </p:spPr>
-        <p:txBody>
-          <a:bodyPr wrap="square" rtlCol="0">
-            <a:spAutoFit/>
-          </a:bodyPr>
-          <a:lstStyle/>
-          <a:p>
-            <a:pPr marL="285750" indent="-285750">
-              <a:buFont typeface="Arial" charset="0"/>
-              <a:buChar char="•"/>
-            </a:pPr>
-            <a:r>
-              <a:rPr lang="en-US" dirty="0" smtClean="0">
-                <a:latin typeface="Times" charset="0"/>
-                <a:ea typeface="Times" charset="0"/>
-                <a:cs typeface="Times" charset="0"/>
-              </a:rPr>
-              <a:t>Important because there is a </a:t>
-            </a:r>
-            <a:r>
-              <a:rPr lang="en-US" b="1" dirty="0" smtClean="0">
-                <a:latin typeface="Times" charset="0"/>
-                <a:ea typeface="Times" charset="0"/>
-                <a:cs typeface="Times" charset="0"/>
-              </a:rPr>
-              <a:t>DANGER TRACK</a:t>
-            </a:r>
-            <a:r>
-              <a:rPr lang="en-US" dirty="0" smtClean="0">
-                <a:latin typeface="Times" charset="0"/>
-                <a:ea typeface="Times" charset="0"/>
-                <a:cs typeface="Times" charset="0"/>
-              </a:rPr>
-              <a:t> in the human genome, which is rich in CNVs</a:t>
-            </a:r>
-            <a:endParaRPr lang="en-US" b="1" dirty="0">
-              <a:latin typeface="Times" charset="0"/>
-              <a:ea typeface="Times" charset="0"/>
-              <a:cs typeface="Times" charset="0"/>
-            </a:endParaRPr>
-          </a:p>
-        </p:txBody>
-      </p:sp>
-      <p:sp>
-        <p:nvSpPr>
-          <p:cNvPr id="10" name="TextBox 9"/>
-          <p:cNvSpPr txBox="1"/>
-          <p:nvPr/>
-        </p:nvSpPr>
-        <p:spPr>
-          <a:xfrm>
-            <a:off x="976392" y="2314939"/>
-            <a:ext cx="6664271" cy="369332"/>
-          </a:xfrm>
-          <a:prstGeom prst="rect">
-            <a:avLst/>
-          </a:prstGeom>
-          <a:noFill/>
-        </p:spPr>
-        <p:txBody>
-          <a:bodyPr wrap="square" rtlCol="0">
-            <a:spAutoFit/>
-          </a:bodyPr>
-          <a:lstStyle/>
-          <a:p>
-            <a:pPr marL="285750" indent="-285750">
-              <a:buFont typeface="Arial" charset="0"/>
-              <a:buChar char="•"/>
-            </a:pPr>
-            <a:r>
-              <a:rPr lang="en-US" dirty="0" smtClean="0">
-                <a:latin typeface="Times" charset="0"/>
-                <a:ea typeface="Times" charset="0"/>
-                <a:cs typeface="Times" charset="0"/>
-              </a:rPr>
-              <a:t>Existing solutions are not good enough</a:t>
-            </a:r>
-            <a:endParaRPr lang="en-US" b="1" dirty="0">
-              <a:latin typeface="Times" charset="0"/>
-              <a:ea typeface="Times" charset="0"/>
-              <a:cs typeface="Times" charset="0"/>
-            </a:endParaRPr>
-          </a:p>
-        </p:txBody>
-      </p:sp>
     </p:spTree>
     <p:extLst>
       <p:ext uri="{BB962C8B-B14F-4D97-AF65-F5344CB8AC3E}">
@@ -4444,7 +4130,7 @@
   <p:timing>
     <p:tnLst>
       <p:par>
-        <p:cTn id="1" dur="indefinite" restart="never" nodeType="tmRoot"/>
+        <p:cTn xmlns:p14="http://schemas.microsoft.com/office/powerpoint/2010/main" id="1" dur="indefinite" restart="never" nodeType="tmRoot"/>
       </p:par>
     </p:tnLst>
   </p:timing>
@@ -4470,7 +4156,104 @@
       </p:grpSpPr>
       <p:sp>
         <p:nvSpPr>
-          <p:cNvPr id="8" name="Footer Placeholder 4"/>
+          <p:cNvPr id="2" name="Title 1"/>
+          <p:cNvSpPr>
+            <a:spLocks noGrp="1"/>
+          </p:cNvSpPr>
+          <p:nvPr>
+            <p:ph type="title"/>
+          </p:nvPr>
+        </p:nvSpPr>
+        <p:spPr/>
+        <p:txBody>
+          <a:bodyPr/>
+          <a:lstStyle/>
+          <a:p>
+            <a:r>
+              <a:rPr lang="en-US" dirty="0" smtClean="0"/>
+              <a:t>Approach</a:t>
+            </a:r>
+            <a:endParaRPr lang="en-US" dirty="0"/>
+          </a:p>
+        </p:txBody>
+      </p:sp>
+      <p:sp>
+        <p:nvSpPr>
+          <p:cNvPr id="3" name="Content Placeholder 2"/>
+          <p:cNvSpPr>
+            <a:spLocks noGrp="1"/>
+          </p:cNvSpPr>
+          <p:nvPr>
+            <p:ph idx="1"/>
+          </p:nvPr>
+        </p:nvSpPr>
+        <p:spPr/>
+        <p:txBody>
+          <a:bodyPr/>
+          <a:lstStyle/>
+          <a:p>
+            <a:r>
+              <a:rPr lang="en-US" dirty="0" smtClean="0"/>
+              <a:t>Instead of working with sets of </a:t>
+            </a:r>
+            <a:r>
+              <a:rPr lang="en-US" dirty="0" err="1" smtClean="0"/>
+              <a:t>kmers</a:t>
+            </a:r>
+            <a:r>
+              <a:rPr lang="en-US" dirty="0" smtClean="0"/>
+              <a:t> (</a:t>
+            </a:r>
+            <a:r>
+              <a:rPr lang="en-US" dirty="0" err="1" smtClean="0"/>
+              <a:t>Canu</a:t>
+            </a:r>
+            <a:r>
+              <a:rPr lang="en-US" dirty="0" smtClean="0"/>
+              <a:t>), we are using k/2-mers and exact distances to all other k/2-mers in a given window.</a:t>
+            </a:r>
+          </a:p>
+          <a:p>
+            <a:pPr lvl="1"/>
+            <a:endParaRPr lang="en-US" dirty="0" smtClean="0"/>
+          </a:p>
+          <a:p>
+            <a:pPr lvl="1"/>
+            <a:r>
+              <a:rPr lang="en-US" dirty="0" smtClean="0"/>
+              <a:t>Using pairs of </a:t>
+            </a:r>
+            <a:r>
+              <a:rPr lang="en-US" dirty="0" err="1" smtClean="0"/>
+              <a:t>kmers</a:t>
+            </a:r>
+            <a:r>
+              <a:rPr lang="en-US" dirty="0" smtClean="0"/>
+              <a:t> with exact distances, it has been shown that the string can be re-constructed uniquely. </a:t>
+            </a:r>
+          </a:p>
+          <a:p>
+            <a:pPr lvl="1"/>
+            <a:endParaRPr lang="en-US" dirty="0" smtClean="0"/>
+          </a:p>
+          <a:p>
+            <a:pPr lvl="1"/>
+            <a:r>
+              <a:rPr lang="en-US" dirty="0" smtClean="0"/>
+              <a:t>Many tools cut accuracy to gain performance. We hope to improve performance such that we need to not sacrifice accuracy.</a:t>
+            </a:r>
+          </a:p>
+          <a:p>
+            <a:pPr marL="457200" lvl="1" indent="0">
+              <a:buNone/>
+            </a:pPr>
+            <a:endParaRPr lang="en-US" dirty="0"/>
+          </a:p>
+        </p:txBody>
+      </p:sp>
+      <p:sp>
+        <p:nvSpPr>
+          <p:cNvPr id="5" name="Footer Placeholder 4"/>
           <p:cNvSpPr>
             <a:spLocks noGrp="1"/>
           </p:cNvSpPr>
@@ -4526,18 +4309,7 @@
                 <a:ea typeface="Times" charset="0"/>
                 <a:cs typeface="Times" charset="0"/>
               </a:rPr>
-              <a:t> Hackathon:              </a:t>
-            </a:r>
-            <a:r>
-              <a:rPr lang="en-US" sz="1600" dirty="0" smtClean="0">
-                <a:solidFill>
-                  <a:schemeClr val="tx1"/>
-                </a:solidFill>
-                <a:latin typeface="Times" charset="0"/>
-                <a:ea typeface="Times" charset="0"/>
-                <a:cs typeface="Times" charset="0"/>
-              </a:rPr>
-              <a:t>May</a:t>
+              <a:t> Hackathon:              May</a:t>
             </a:r>
             <a:r>
               <a:rPr lang="en-US" sz="1400" dirty="0" smtClean="0">
@@ -4618,7 +4390,7 @@
       </p:sp>
       <p:cxnSp>
         <p:nvCxnSpPr>
-          <p:cNvPr id="3" name="Straight Connector 2"/>
+          <p:cNvPr id="6" name="Straight Connector 5"/>
           <p:cNvCxnSpPr/>
           <p:nvPr/>
         </p:nvCxnSpPr>
@@ -4653,194 +4425,16 @@
           </a:fontRef>
         </p:style>
       </p:cxnSp>
-      <p:sp>
-        <p:nvSpPr>
-          <p:cNvPr id="2" name="TextBox 1"/>
-          <p:cNvSpPr txBox="1"/>
-          <p:nvPr/>
-        </p:nvSpPr>
-        <p:spPr>
-          <a:xfrm>
-            <a:off x="0" y="0"/>
-            <a:ext cx="12161520" cy="584775"/>
-          </a:xfrm>
-          <a:prstGeom prst="rect">
-            <a:avLst/>
-          </a:prstGeom>
-          <a:noFill/>
-        </p:spPr>
-        <p:txBody>
-          <a:bodyPr wrap="square" rtlCol="0">
-            <a:spAutoFit/>
-          </a:bodyPr>
-          <a:lstStyle/>
-          <a:p>
-            <a:pPr algn="ctr"/>
-            <a:r>
-              <a:rPr lang="en-US" sz="3200" dirty="0" smtClean="0">
-                <a:latin typeface="Times" charset="0"/>
-                <a:ea typeface="Times" charset="0"/>
-                <a:cs typeface="Times" charset="0"/>
-              </a:rPr>
-              <a:t>Contribution</a:t>
-            </a:r>
-            <a:endParaRPr lang="en-US" sz="3200" dirty="0">
-              <a:latin typeface="Times" charset="0"/>
-              <a:ea typeface="Times" charset="0"/>
-              <a:cs typeface="Times" charset="0"/>
-            </a:endParaRPr>
-          </a:p>
-        </p:txBody>
-      </p:sp>
-      <p:sp>
-        <p:nvSpPr>
-          <p:cNvPr id="4" name="TextBox 3"/>
-          <p:cNvSpPr txBox="1"/>
-          <p:nvPr/>
-        </p:nvSpPr>
-        <p:spPr>
-          <a:xfrm>
-            <a:off x="604434" y="976393"/>
-            <a:ext cx="5610386" cy="369332"/>
-          </a:xfrm>
-          <a:prstGeom prst="rect">
-            <a:avLst/>
-          </a:prstGeom>
-          <a:noFill/>
-        </p:spPr>
-        <p:txBody>
-          <a:bodyPr wrap="square" rtlCol="0">
-            <a:spAutoFit/>
-          </a:bodyPr>
-          <a:lstStyle/>
-          <a:p>
-            <a:pPr marL="285750" indent="-285750">
-              <a:buFont typeface="Arial" charset="0"/>
-              <a:buChar char="•"/>
-            </a:pPr>
-            <a:endParaRPr lang="en-US">
-              <a:latin typeface="Times" charset="0"/>
-              <a:ea typeface="Times" charset="0"/>
-              <a:cs typeface="Times" charset="0"/>
-            </a:endParaRPr>
-          </a:p>
-        </p:txBody>
-      </p:sp>
-      <p:sp>
-        <p:nvSpPr>
-          <p:cNvPr id="5" name="TextBox 4"/>
-          <p:cNvSpPr txBox="1"/>
-          <p:nvPr/>
-        </p:nvSpPr>
-        <p:spPr>
-          <a:xfrm>
-            <a:off x="712921" y="2311074"/>
-            <a:ext cx="9283486" cy="369332"/>
-          </a:xfrm>
-          <a:prstGeom prst="rect">
-            <a:avLst/>
-          </a:prstGeom>
-          <a:noFill/>
-        </p:spPr>
-        <p:txBody>
-          <a:bodyPr wrap="square" rtlCol="0">
-            <a:spAutoFit/>
-          </a:bodyPr>
-          <a:lstStyle/>
-          <a:p>
-            <a:pPr marL="285750" indent="-285750">
-              <a:buFont typeface="Arial" charset="0"/>
-              <a:buChar char="•"/>
-            </a:pPr>
-            <a:r>
-              <a:rPr lang="en-US" dirty="0" smtClean="0">
-                <a:latin typeface="Times" charset="0"/>
-                <a:ea typeface="Times" charset="0"/>
-                <a:cs typeface="Times" charset="0"/>
-              </a:rPr>
-              <a:t>Novel locality sensitivity hashing (LSH) to filter out low quality comparisons in clustering </a:t>
-            </a:r>
-            <a:endParaRPr lang="en-US" dirty="0">
-              <a:latin typeface="Times" charset="0"/>
-              <a:ea typeface="Times" charset="0"/>
-              <a:cs typeface="Times" charset="0"/>
-            </a:endParaRPr>
-          </a:p>
-        </p:txBody>
-      </p:sp>
-      <p:sp>
-        <p:nvSpPr>
-          <p:cNvPr id="9" name="TextBox 8"/>
-          <p:cNvSpPr txBox="1"/>
-          <p:nvPr/>
-        </p:nvSpPr>
-        <p:spPr>
-          <a:xfrm>
-            <a:off x="712921" y="1368011"/>
-            <a:ext cx="9484964" cy="646331"/>
-          </a:xfrm>
-          <a:prstGeom prst="rect">
-            <a:avLst/>
-          </a:prstGeom>
-          <a:noFill/>
-        </p:spPr>
-        <p:txBody>
-          <a:bodyPr wrap="square" rtlCol="0">
-            <a:spAutoFit/>
-          </a:bodyPr>
-          <a:lstStyle/>
-          <a:p>
-            <a:pPr marL="285750" indent="-285750">
-              <a:buFont typeface="Arial" charset="0"/>
-              <a:buChar char="•"/>
-            </a:pPr>
-            <a:r>
-              <a:rPr lang="en-US" dirty="0" smtClean="0">
-                <a:latin typeface="Times" charset="0"/>
-                <a:ea typeface="Times" charset="0"/>
-                <a:cs typeface="Times" charset="0"/>
-              </a:rPr>
-              <a:t>Resolving copy number variations (CNV) using clustering of long reads from partial datasets</a:t>
-            </a:r>
-          </a:p>
-          <a:p>
-            <a:pPr marL="742950" lvl="1" indent="-285750">
-              <a:buFont typeface="Arial" charset="0"/>
-              <a:buChar char="•"/>
-            </a:pPr>
-            <a:r>
-              <a:rPr lang="en-US" dirty="0" smtClean="0">
-                <a:latin typeface="Times" charset="0"/>
-                <a:ea typeface="Times" charset="0"/>
-                <a:cs typeface="Times" charset="0"/>
-              </a:rPr>
-              <a:t>Important because this will reduce the size of data needed to be transferred over the network</a:t>
-            </a:r>
-            <a:endParaRPr lang="en-US" dirty="0">
-              <a:latin typeface="Times" charset="0"/>
-              <a:ea typeface="Times" charset="0"/>
-              <a:cs typeface="Times" charset="0"/>
-            </a:endParaRPr>
-          </a:p>
-        </p:txBody>
-      </p:sp>
     </p:spTree>
     <p:extLst>
       <p:ext uri="{BB962C8B-B14F-4D97-AF65-F5344CB8AC3E}">
-        <p14:creationId xmlns:p14="http://schemas.microsoft.com/office/powerpoint/2010/main" val="869449994"/>
+        <p14:creationId xmlns:p14="http://schemas.microsoft.com/office/powerpoint/2010/main" val="868257674"/>
       </p:ext>
     </p:extLst>
   </p:cSld>
   <p:clrMapOvr>
     <a:masterClrMapping/>
   </p:clrMapOvr>
-  <p:timing>
-    <p:tnLst>
-      <p:par>
-        <p:cTn id="1" dur="indefinite" restart="never" nodeType="tmRoot"/>
-      </p:par>
-    </p:tnLst>
-  </p:timing>
 </p:sld>
 </file>
 
@@ -4863,7 +4457,99 @@
       </p:grpSpPr>
       <p:sp>
         <p:nvSpPr>
-          <p:cNvPr id="8" name="Footer Placeholder 4"/>
+          <p:cNvPr id="2" name="Title 1"/>
+          <p:cNvSpPr>
+            <a:spLocks noGrp="1"/>
+          </p:cNvSpPr>
+          <p:nvPr>
+            <p:ph type="title"/>
+          </p:nvPr>
+        </p:nvSpPr>
+        <p:spPr/>
+        <p:txBody>
+          <a:bodyPr/>
+          <a:lstStyle/>
+          <a:p>
+            <a:r>
+              <a:rPr lang="en-US" dirty="0" smtClean="0"/>
+              <a:t>Magic hashing function</a:t>
+            </a:r>
+            <a:endParaRPr lang="en-US" dirty="0"/>
+          </a:p>
+        </p:txBody>
+      </p:sp>
+      <p:sp>
+        <p:nvSpPr>
+          <p:cNvPr id="3" name="Content Placeholder 2"/>
+          <p:cNvSpPr>
+            <a:spLocks noGrp="1"/>
+          </p:cNvSpPr>
+          <p:nvPr>
+            <p:ph idx="1"/>
+          </p:nvPr>
+        </p:nvSpPr>
+        <p:spPr/>
+        <p:txBody>
+          <a:bodyPr/>
+          <a:lstStyle/>
+          <a:p>
+            <a:r>
+              <a:rPr lang="en-US" dirty="0" smtClean="0"/>
+              <a:t>First step is to calculate pairwise distances between all </a:t>
+            </a:r>
+            <a:r>
+              <a:rPr lang="en-US" dirty="0" err="1" smtClean="0"/>
+              <a:t>kmers</a:t>
+            </a:r>
+            <a:r>
+              <a:rPr lang="en-US" dirty="0"/>
+              <a:t> </a:t>
+            </a:r>
+            <a:r>
+              <a:rPr lang="en-US" dirty="0" smtClean="0"/>
+              <a:t>in a window.</a:t>
+            </a:r>
+          </a:p>
+          <a:p>
+            <a:endParaRPr lang="en-US" dirty="0" smtClean="0"/>
+          </a:p>
+          <a:p>
+            <a:r>
+              <a:rPr lang="en-US" dirty="0" err="1" smtClean="0"/>
+              <a:t>Minhash</a:t>
+            </a:r>
+            <a:r>
+              <a:rPr lang="en-US" dirty="0" smtClean="0"/>
+              <a:t> using the binning of distances.</a:t>
+            </a:r>
+          </a:p>
+          <a:p>
+            <a:pPr lvl="1"/>
+            <a:endParaRPr lang="en-US" dirty="0" smtClean="0"/>
+          </a:p>
+          <a:p>
+            <a:pPr lvl="1"/>
+            <a:r>
+              <a:rPr lang="en-US" dirty="0" smtClean="0"/>
+              <a:t>Magically maps information such that 2 close sequence profiles are mapped into a number. </a:t>
+            </a:r>
+          </a:p>
+          <a:p>
+            <a:pPr lvl="1"/>
+            <a:endParaRPr lang="en-US" dirty="0" smtClean="0"/>
+          </a:p>
+          <a:p>
+            <a:pPr lvl="1"/>
+            <a:r>
+              <a:rPr lang="en-US" dirty="0" smtClean="0"/>
+              <a:t>Comparison to reference is therefore random memory access.</a:t>
+            </a:r>
+          </a:p>
+        </p:txBody>
+      </p:sp>
+      <p:sp>
+        <p:nvSpPr>
+          <p:cNvPr id="5" name="Footer Placeholder 4"/>
           <p:cNvSpPr>
             <a:spLocks noGrp="1"/>
           </p:cNvSpPr>
@@ -4919,18 +4605,7 @@
                 <a:ea typeface="Times" charset="0"/>
                 <a:cs typeface="Times" charset="0"/>
               </a:rPr>
-              <a:t> Hackathon:              </a:t>
-            </a:r>
-            <a:r>
-              <a:rPr lang="en-US" sz="1600" dirty="0" smtClean="0">
-                <a:solidFill>
-                  <a:schemeClr val="tx1"/>
-                </a:solidFill>
-                <a:latin typeface="Times" charset="0"/>
-                <a:ea typeface="Times" charset="0"/>
-                <a:cs typeface="Times" charset="0"/>
-              </a:rPr>
-              <a:t>May</a:t>
+              <a:t> Hackathon:              May</a:t>
             </a:r>
             <a:r>
               <a:rPr lang="en-US" sz="1400" dirty="0" smtClean="0">
@@ -5011,7 +4686,7 @@
       </p:sp>
       <p:cxnSp>
         <p:nvCxnSpPr>
-          <p:cNvPr id="3" name="Straight Connector 2"/>
+          <p:cNvPr id="6" name="Straight Connector 5"/>
           <p:cNvCxnSpPr/>
           <p:nvPr/>
         </p:nvCxnSpPr>
@@ -5046,16 +4721,69 @@
           </a:fontRef>
         </p:style>
       </p:cxnSp>
-      <p:sp>
-        <p:nvSpPr>
-          <p:cNvPr id="2" name="TextBox 1"/>
+    </p:spTree>
+    <p:extLst>
+      <p:ext uri="{BB962C8B-B14F-4D97-AF65-F5344CB8AC3E}">
+        <p14:creationId xmlns:p14="http://schemas.microsoft.com/office/powerpoint/2010/main" val="597375239"/>
+      </p:ext>
+    </p:extLst>
+  </p:cSld>
+  <p:clrMapOvr>
+    <a:masterClrMapping/>
+  </p:clrMapOvr>
+</p:sld>
+</file>
+
+<file path=ppt/slides/slide5.xml><?xml version="1.0" encoding="utf-8"?>
+<p:sld xmlns:a="http://schemas.openxmlformats.org/drawingml/2006/main" xmlns:r="http://schemas.openxmlformats.org/officeDocument/2006/relationships" xmlns:p="http://schemas.openxmlformats.org/presentationml/2006/main">
+  <p:cSld>
+    <p:spTree>
+      <p:nvGrpSpPr>
+        <p:cNvPr id="1" name=""/>
+        <p:cNvGrpSpPr/>
+        <p:nvPr/>
+      </p:nvGrpSpPr>
+      <p:grpSpPr>
+        <a:xfrm>
+          <a:off x="0" y="0"/>
+          <a:ext cx="0" cy="0"/>
+          <a:chOff x="0" y="0"/>
+          <a:chExt cx="0" cy="0"/>
+        </a:xfrm>
+      </p:grpSpPr>
+      <p:sp>
+        <p:nvSpPr>
+          <p:cNvPr id="2" name="Title 1"/>
+          <p:cNvSpPr>
+            <a:spLocks noGrp="1"/>
+          </p:cNvSpPr>
+          <p:nvPr>
+            <p:ph type="title"/>
+          </p:nvPr>
+        </p:nvSpPr>
+        <p:spPr/>
+        <p:txBody>
+          <a:bodyPr/>
+          <a:lstStyle/>
+          <a:p>
+            <a:r>
+              <a:rPr lang="en-US" dirty="0" err="1" smtClean="0"/>
+              <a:t>MinHash</a:t>
+            </a:r>
+            <a:endParaRPr lang="en-US" dirty="0"/>
+          </a:p>
+        </p:txBody>
+      </p:sp>
+      <p:sp>
+        <p:nvSpPr>
+          <p:cNvPr id="5" name="TextBox 4"/>
           <p:cNvSpPr txBox="1"/>
           <p:nvPr/>
         </p:nvSpPr>
         <p:spPr>
           <a:xfrm>
-            <a:off x="0" y="391618"/>
-            <a:ext cx="12161520" cy="584775"/>
+            <a:off x="2049551" y="2439518"/>
+            <a:ext cx="1378728" cy="1200329"/>
           </a:xfrm>
           <a:prstGeom prst="rect">
             <a:avLst/>
@@ -5063,38 +4791,179 @@
           <a:noFill/>
         </p:spPr>
         <p:txBody>
-          <a:bodyPr wrap="square" rtlCol="0">
+          <a:bodyPr wrap="none" rtlCol="0">
             <a:spAutoFit/>
           </a:bodyPr>
           <a:lstStyle/>
           <a:p>
+            <a:r>
+              <a:rPr lang="en-US" dirty="0" smtClean="0"/>
+              <a:t>{</a:t>
+            </a:r>
+            <a:r>
+              <a:rPr lang="en-US" dirty="0"/>
+              <a:t>α</a:t>
+            </a:r>
+            <a:r>
+              <a:rPr lang="en-US" baseline="-25000" dirty="0"/>
+              <a:t>1,</a:t>
+            </a:r>
+            <a:r>
+              <a:rPr lang="en-US" dirty="0"/>
+              <a:t> β</a:t>
+            </a:r>
+            <a:r>
+              <a:rPr lang="en-US" baseline="-25000" dirty="0"/>
+              <a:t>1, </a:t>
+            </a:r>
+            <a:r>
+              <a:rPr lang="en-US" dirty="0" smtClean="0"/>
+              <a:t>d </a:t>
+            </a:r>
+            <a:r>
+              <a:rPr lang="en-US" dirty="0"/>
+              <a:t>&lt; t},</a:t>
+            </a:r>
+          </a:p>
+          <a:p>
+            <a:r>
+              <a:rPr lang="en-US" dirty="0"/>
+              <a:t> </a:t>
+            </a:r>
+            <a:r>
+              <a:rPr lang="is-IS" dirty="0"/>
+              <a:t>…		    </a:t>
+            </a:r>
+            <a:r>
+              <a:rPr lang="is-IS" dirty="0" smtClean="0"/>
+              <a:t>         </a:t>
+            </a:r>
+            <a:endParaRPr lang="en-US" dirty="0"/>
+          </a:p>
+          <a:p>
+            <a:endParaRPr lang="en-US" dirty="0"/>
+          </a:p>
+        </p:txBody>
+      </p:sp>
+      <p:cxnSp>
+        <p:nvCxnSpPr>
+          <p:cNvPr id="7" name="Straight Arrow Connector 6"/>
+          <p:cNvCxnSpPr/>
+          <p:nvPr/>
+        </p:nvCxnSpPr>
+        <p:spPr>
+          <a:xfrm>
+            <a:off x="4061380" y="2967661"/>
+            <a:ext cx="1119080" cy="0"/>
+          </a:xfrm>
+          <a:prstGeom prst="straightConnector1">
+            <a:avLst/>
+          </a:prstGeom>
+          <a:ln>
+            <a:tailEnd type="arrow"/>
+          </a:ln>
+        </p:spPr>
+        <p:style>
+          <a:lnRef idx="2">
+            <a:schemeClr val="accent1"/>
+          </a:lnRef>
+          <a:fillRef idx="0">
+            <a:schemeClr val="accent1"/>
+          </a:fillRef>
+          <a:effectRef idx="1">
+            <a:schemeClr val="accent1"/>
+          </a:effectRef>
+          <a:fontRef idx="minor">
+            <a:schemeClr val="tx1"/>
+          </a:fontRef>
+        </p:style>
+      </p:cxnSp>
+      <p:sp>
+        <p:nvSpPr>
+          <p:cNvPr id="8" name="Left Bracket 7"/>
+          <p:cNvSpPr/>
+          <p:nvPr/>
+        </p:nvSpPr>
+        <p:spPr>
+          <a:xfrm>
+            <a:off x="1873516" y="2439518"/>
+            <a:ext cx="176035" cy="1200329"/>
+          </a:xfrm>
+          <a:prstGeom prst="leftBracket">
+            <a:avLst/>
+          </a:prstGeom>
+        </p:spPr>
+        <p:style>
+          <a:lnRef idx="2">
+            <a:schemeClr val="accent1"/>
+          </a:lnRef>
+          <a:fillRef idx="0">
+            <a:schemeClr val="accent1"/>
+          </a:fillRef>
+          <a:effectRef idx="1">
+            <a:schemeClr val="accent1"/>
+          </a:effectRef>
+          <a:fontRef idx="minor">
+            <a:schemeClr val="tx1"/>
+          </a:fontRef>
+        </p:style>
+        <p:txBody>
+          <a:bodyPr rtlCol="0" anchor="ctr"/>
+          <a:lstStyle/>
+          <a:p>
             <a:pPr algn="ctr"/>
-            <a:r>
-              <a:rPr lang="en-US" sz="3200" dirty="0" smtClean="0">
-                <a:latin typeface="Times" charset="0"/>
-                <a:ea typeface="Times" charset="0"/>
-                <a:cs typeface="Times" charset="0"/>
-              </a:rPr>
-              <a:t>Tools and Core Libraries</a:t>
-            </a:r>
-            <a:endParaRPr lang="en-US" sz="3200" dirty="0">
-              <a:latin typeface="Times" charset="0"/>
-              <a:ea typeface="Times" charset="0"/>
-              <a:cs typeface="Times" charset="0"/>
-            </a:endParaRPr>
-          </a:p>
-        </p:txBody>
-      </p:sp>
-      <p:sp>
-        <p:nvSpPr>
-          <p:cNvPr id="4" name="TextBox 3"/>
+            <a:endParaRPr lang="en-US"/>
+          </a:p>
+        </p:txBody>
+      </p:sp>
+      <p:sp>
+        <p:nvSpPr>
+          <p:cNvPr id="10" name="Right Bracket 9"/>
+          <p:cNvSpPr/>
+          <p:nvPr/>
+        </p:nvSpPr>
+        <p:spPr>
+          <a:xfrm>
+            <a:off x="3520701" y="2439518"/>
+            <a:ext cx="146676" cy="1200329"/>
+          </a:xfrm>
+          <a:prstGeom prst="rightBracket">
+            <a:avLst/>
+          </a:prstGeom>
+        </p:spPr>
+        <p:style>
+          <a:lnRef idx="2">
+            <a:schemeClr val="accent1"/>
+          </a:lnRef>
+          <a:fillRef idx="0">
+            <a:schemeClr val="accent1"/>
+          </a:fillRef>
+          <a:effectRef idx="1">
+            <a:schemeClr val="accent1"/>
+          </a:effectRef>
+          <a:fontRef idx="minor">
+            <a:schemeClr val="tx1"/>
+          </a:fontRef>
+        </p:style>
+        <p:txBody>
+          <a:bodyPr rtlCol="0" anchor="ctr"/>
+          <a:lstStyle/>
+          <a:p>
+            <a:pPr algn="ctr"/>
+            <a:endParaRPr lang="en-US"/>
+          </a:p>
+        </p:txBody>
+      </p:sp>
+      <p:sp>
+        <p:nvSpPr>
+          <p:cNvPr id="16" name="TextBox 15"/>
           <p:cNvSpPr txBox="1"/>
           <p:nvPr/>
         </p:nvSpPr>
         <p:spPr>
           <a:xfrm>
-            <a:off x="604434" y="976393"/>
-            <a:ext cx="5610386" cy="369332"/>
+            <a:off x="568853" y="2782995"/>
+            <a:ext cx="1083988" cy="369332"/>
           </a:xfrm>
           <a:prstGeom prst="rect">
             <a:avLst/>
@@ -5102,33 +4971,33 @@
           <a:noFill/>
         </p:spPr>
         <p:txBody>
-          <a:bodyPr wrap="square" rtlCol="0">
+          <a:bodyPr wrap="none" rtlCol="0">
             <a:spAutoFit/>
           </a:bodyPr>
           <a:lstStyle/>
           <a:p>
-            <a:pPr marL="285750" indent="-285750">
-              <a:buFont typeface="Arial" charset="0"/>
-              <a:buChar char="•"/>
-            </a:pPr>
-            <a:endParaRPr lang="en-US">
-              <a:latin typeface="Times" charset="0"/>
-              <a:ea typeface="Times" charset="0"/>
-              <a:cs typeface="Times" charset="0"/>
-            </a:endParaRPr>
-          </a:p>
-        </p:txBody>
-      </p:sp>
-      <p:sp>
-        <p:nvSpPr>
-          <p:cNvPr id="5" name="TextBox 4"/>
+            <a:r>
+              <a:rPr lang="en-US" dirty="0" err="1" smtClean="0"/>
+              <a:t>MinHash</a:t>
+            </a:r>
+            <a:r>
+              <a:rPr lang="en-US" dirty="0" smtClean="0"/>
+              <a:t>:</a:t>
+            </a:r>
+            <a:endParaRPr lang="en-US" dirty="0"/>
+          </a:p>
+        </p:txBody>
+      </p:sp>
+      <p:sp>
+        <p:nvSpPr>
+          <p:cNvPr id="17" name="TextBox 16"/>
           <p:cNvSpPr txBox="1"/>
           <p:nvPr/>
         </p:nvSpPr>
         <p:spPr>
           <a:xfrm>
-            <a:off x="852407" y="1487837"/>
-            <a:ext cx="6292312" cy="646331"/>
+            <a:off x="5721138" y="2409704"/>
+            <a:ext cx="917852" cy="646331"/>
           </a:xfrm>
           <a:prstGeom prst="rect">
             <a:avLst/>
@@ -5136,160 +5005,285 @@
           <a:noFill/>
         </p:spPr>
         <p:txBody>
-          <a:bodyPr wrap="square" rtlCol="0">
+          <a:bodyPr wrap="none" rtlCol="0">
             <a:spAutoFit/>
           </a:bodyPr>
           <a:lstStyle/>
           <a:p>
-            <a:pPr marL="285750" indent="-285750">
-              <a:buFont typeface="Arial" charset="0"/>
-              <a:buChar char="•"/>
-            </a:pPr>
-            <a:r>
-              <a:rPr lang="en-US" dirty="0" err="1" smtClean="0">
+            <a:r>
+              <a:rPr lang="en-US" dirty="0" smtClean="0"/>
+              <a:t>Integer,</a:t>
+            </a:r>
+          </a:p>
+          <a:p>
+            <a:r>
+              <a:rPr lang="is-IS" dirty="0" smtClean="0"/>
+              <a:t>…</a:t>
+            </a:r>
+            <a:endParaRPr lang="en-US" dirty="0"/>
+          </a:p>
+        </p:txBody>
+      </p:sp>
+      <p:sp>
+        <p:nvSpPr>
+          <p:cNvPr id="19" name="Left Bracket 18"/>
+          <p:cNvSpPr/>
+          <p:nvPr/>
+        </p:nvSpPr>
+        <p:spPr>
+          <a:xfrm>
+            <a:off x="5638349" y="2439518"/>
+            <a:ext cx="176035" cy="1200329"/>
+          </a:xfrm>
+          <a:prstGeom prst="leftBracket">
+            <a:avLst/>
+          </a:prstGeom>
+        </p:spPr>
+        <p:style>
+          <a:lnRef idx="2">
+            <a:schemeClr val="accent1"/>
+          </a:lnRef>
+          <a:fillRef idx="0">
+            <a:schemeClr val="accent1"/>
+          </a:fillRef>
+          <a:effectRef idx="1">
+            <a:schemeClr val="accent1"/>
+          </a:effectRef>
+          <a:fontRef idx="minor">
+            <a:schemeClr val="tx1"/>
+          </a:fontRef>
+        </p:style>
+        <p:txBody>
+          <a:bodyPr rtlCol="0" anchor="ctr"/>
+          <a:lstStyle/>
+          <a:p>
+            <a:pPr algn="ctr"/>
+            <a:endParaRPr lang="en-US"/>
+          </a:p>
+        </p:txBody>
+      </p:sp>
+      <p:sp>
+        <p:nvSpPr>
+          <p:cNvPr id="20" name="Right Bracket 19"/>
+          <p:cNvSpPr/>
+          <p:nvPr/>
+        </p:nvSpPr>
+        <p:spPr>
+          <a:xfrm>
+            <a:off x="6967471" y="2439518"/>
+            <a:ext cx="146676" cy="1200329"/>
+          </a:xfrm>
+          <a:prstGeom prst="rightBracket">
+            <a:avLst/>
+          </a:prstGeom>
+        </p:spPr>
+        <p:style>
+          <a:lnRef idx="2">
+            <a:schemeClr val="accent1"/>
+          </a:lnRef>
+          <a:fillRef idx="0">
+            <a:schemeClr val="accent1"/>
+          </a:fillRef>
+          <a:effectRef idx="1">
+            <a:schemeClr val="accent1"/>
+          </a:effectRef>
+          <a:fontRef idx="minor">
+            <a:schemeClr val="tx1"/>
+          </a:fontRef>
+        </p:style>
+        <p:txBody>
+          <a:bodyPr rtlCol="0" anchor="ctr"/>
+          <a:lstStyle/>
+          <a:p>
+            <a:pPr algn="ctr"/>
+            <a:endParaRPr lang="en-US"/>
+          </a:p>
+        </p:txBody>
+      </p:sp>
+      <p:sp>
+        <p:nvSpPr>
+          <p:cNvPr id="21" name="Footer Placeholder 4"/>
+          <p:cNvSpPr>
+            <a:spLocks noGrp="1"/>
+          </p:cNvSpPr>
+          <p:nvPr>
+            <p:ph type="ftr" sz="quarter" idx="11"/>
+          </p:nvPr>
+        </p:nvSpPr>
+        <p:spPr>
+          <a:xfrm>
+            <a:off x="0" y="6318274"/>
+            <a:ext cx="12192000" cy="457200"/>
+          </a:xfrm>
+          <a:noFill/>
+        </p:spPr>
+        <p:txBody>
+          <a:bodyPr/>
+          <a:lstStyle/>
+          <a:p>
+            <a:pPr marL="920750" indent="-920750" algn="l"/>
+            <a:r>
+              <a:rPr lang="en-US" sz="1400" dirty="0">
+                <a:solidFill>
+                  <a:schemeClr val="tx1"/>
+                </a:solidFill>
+              </a:rPr>
+              <a:t>	</a:t>
+            </a:r>
+            <a:r>
+              <a:rPr lang="en-US" sz="1400" dirty="0" smtClean="0">
+                <a:solidFill>
+                  <a:schemeClr val="tx1"/>
+                </a:solidFill>
+              </a:rPr>
+              <a:t>							                                   </a:t>
+            </a:r>
+            <a:r>
+              <a:rPr lang="en-US" sz="1600" dirty="0" err="1" smtClean="0">
+                <a:solidFill>
+                  <a:schemeClr val="tx1"/>
+                </a:solidFill>
                 <a:latin typeface="Times" charset="0"/>
                 <a:ea typeface="Times" charset="0"/>
                 <a:cs typeface="Times" charset="0"/>
               </a:rPr>
-              <a:t>Blasr</a:t>
-            </a:r>
-            <a:r>
-              <a:rPr lang="en-US" dirty="0" smtClean="0">
+              <a:t>Biofrontiers</a:t>
+            </a:r>
+            <a:r>
+              <a:rPr lang="en-US" sz="1600" dirty="0" smtClean="0">
+                <a:solidFill>
+                  <a:schemeClr val="tx1"/>
+                </a:solidFill>
                 <a:latin typeface="Times" charset="0"/>
                 <a:ea typeface="Times" charset="0"/>
                 <a:cs typeface="Times" charset="0"/>
               </a:rPr>
-              <a:t>, </a:t>
-            </a:r>
-            <a:r>
-              <a:rPr lang="en-US" dirty="0" err="1" smtClean="0">
+              <a:t> Hackathon:              May</a:t>
+            </a:r>
+            <a:r>
+              <a:rPr lang="en-US" sz="1400" dirty="0" smtClean="0">
+                <a:solidFill>
+                  <a:schemeClr val="tx1"/>
+                </a:solidFill>
                 <a:latin typeface="Times" charset="0"/>
                 <a:ea typeface="Times" charset="0"/>
                 <a:cs typeface="Times" charset="0"/>
               </a:rPr>
-              <a:t>MagicBlast</a:t>
-            </a:r>
-            <a:endParaRPr lang="en-US" dirty="0" smtClean="0">
-              <a:latin typeface="Times" charset="0"/>
-              <a:ea typeface="Times" charset="0"/>
-              <a:cs typeface="Times" charset="0"/>
-            </a:endParaRPr>
-          </a:p>
-          <a:p>
-            <a:pPr marL="742950" lvl="1" indent="-285750">
-              <a:buFont typeface="Arial" charset="0"/>
-              <a:buChar char="•"/>
-            </a:pPr>
-            <a:r>
-              <a:rPr lang="en-US" dirty="0" smtClean="0">
+              <a:t>:</a:t>
+            </a:r>
+            <a:r>
+              <a:rPr lang="en-US" sz="1400" b="1" dirty="0" smtClean="0">
+                <a:solidFill>
+                  <a:schemeClr val="tx1"/>
+                </a:solidFill>
                 <a:latin typeface="Times" charset="0"/>
                 <a:ea typeface="Times" charset="0"/>
                 <a:cs typeface="Times" charset="0"/>
               </a:rPr>
-              <a:t>Long read aligners</a:t>
-            </a:r>
-            <a:endParaRPr lang="en-US" dirty="0">
-              <a:latin typeface="Times" charset="0"/>
-              <a:ea typeface="Times" charset="0"/>
-              <a:cs typeface="Times" charset="0"/>
-            </a:endParaRPr>
-          </a:p>
-        </p:txBody>
-      </p:sp>
-      <p:sp>
-        <p:nvSpPr>
-          <p:cNvPr id="7" name="TextBox 6"/>
-          <p:cNvSpPr txBox="1"/>
-          <p:nvPr/>
-        </p:nvSpPr>
-        <p:spPr>
-          <a:xfrm>
-            <a:off x="852407" y="2183947"/>
-            <a:ext cx="6292312" cy="646331"/>
-          </a:xfrm>
-          <a:prstGeom prst="rect">
-            <a:avLst/>
-          </a:prstGeom>
-          <a:noFill/>
-        </p:spPr>
-        <p:txBody>
-          <a:bodyPr wrap="square" rtlCol="0">
-            <a:spAutoFit/>
-          </a:bodyPr>
-          <a:lstStyle/>
-          <a:p>
-            <a:pPr marL="285750" indent="-285750">
-              <a:buFont typeface="Arial" charset="0"/>
-              <a:buChar char="•"/>
-            </a:pPr>
-            <a:r>
-              <a:rPr lang="en-US" dirty="0" err="1" smtClean="0">
+              <a:t>	</a:t>
+            </a:r>
+          </a:p>
+          <a:p>
+            <a:pPr algn="l"/>
+            <a:r>
+              <a:rPr lang="en-US" sz="1400" b="1" dirty="0" smtClean="0">
+                <a:solidFill>
+                  <a:schemeClr val="tx1"/>
+                </a:solidFill>
                 <a:latin typeface="Times" charset="0"/>
                 <a:ea typeface="Times" charset="0"/>
                 <a:cs typeface="Times" charset="0"/>
               </a:rPr>
-              <a:t>Canu</a:t>
-            </a:r>
-            <a:r>
-              <a:rPr lang="en-US" dirty="0" smtClean="0">
+              <a:t>					</a:t>
+            </a:r>
+            <a:r>
+              <a:rPr lang="en-US" sz="1400" b="1" dirty="0">
+                <a:solidFill>
+                  <a:schemeClr val="tx1"/>
+                </a:solidFill>
                 <a:latin typeface="Times" charset="0"/>
                 <a:ea typeface="Times" charset="0"/>
                 <a:cs typeface="Times" charset="0"/>
               </a:rPr>
-              <a:t>, </a:t>
-            </a:r>
-            <a:r>
-              <a:rPr lang="en-US" dirty="0" err="1" smtClean="0">
+              <a:t> </a:t>
+            </a:r>
+            <a:r>
+              <a:rPr lang="en-US" sz="1400" b="1" dirty="0" smtClean="0">
+                <a:solidFill>
+                  <a:schemeClr val="tx1"/>
+                </a:solidFill>
                 <a:latin typeface="Times" charset="0"/>
                 <a:ea typeface="Times" charset="0"/>
                 <a:cs typeface="Times" charset="0"/>
               </a:rPr>
-              <a:t>Mhap</a:t>
-            </a:r>
-            <a:endParaRPr lang="en-US" dirty="0" smtClean="0">
-              <a:latin typeface="Times" charset="0"/>
-              <a:ea typeface="Times" charset="0"/>
-              <a:cs typeface="Times" charset="0"/>
-            </a:endParaRPr>
-          </a:p>
-          <a:p>
-            <a:pPr marL="742950" lvl="1" indent="-285750">
-              <a:buFont typeface="Arial" charset="0"/>
-              <a:buChar char="•"/>
-            </a:pPr>
-            <a:r>
-              <a:rPr lang="en-US" dirty="0" smtClean="0">
+              <a:t>                                                                                             </a:t>
+            </a:r>
+            <a:r>
+              <a:rPr lang="en-US" sz="1400" b="1" dirty="0" smtClean="0">
+                <a:solidFill>
+                  <a:srgbClr val="6AA4C2"/>
+                </a:solidFill>
                 <a:latin typeface="Times" charset="0"/>
                 <a:ea typeface="Times" charset="0"/>
                 <a:cs typeface="Times" charset="0"/>
               </a:rPr>
-              <a:t>Hashing and assembly</a:t>
-            </a:r>
-            <a:endParaRPr lang="en-US" dirty="0">
-              <a:latin typeface="Times" charset="0"/>
-              <a:ea typeface="Times" charset="0"/>
-              <a:cs typeface="Times" charset="0"/>
+              <a:t>CU Boulder                                       2017</a:t>
+            </a:r>
+            <a:endParaRPr lang="en-US" sz="1400" b="1" dirty="0">
+              <a:solidFill>
+                <a:srgbClr val="FDCD53"/>
+              </a:solidFill>
             </a:endParaRPr>
           </a:p>
         </p:txBody>
       </p:sp>
+      <p:cxnSp>
+        <p:nvCxnSpPr>
+          <p:cNvPr id="22" name="Straight Connector 21"/>
+          <p:cNvCxnSpPr/>
+          <p:nvPr/>
+        </p:nvCxnSpPr>
+        <p:spPr>
+          <a:xfrm>
+            <a:off x="0" y="6205605"/>
+            <a:ext cx="12161520" cy="0"/>
+          </a:xfrm>
+          <a:prstGeom prst="line">
+            <a:avLst/>
+          </a:prstGeom>
+          <a:ln w="6350">
+            <a:solidFill>
+              <a:schemeClr val="tx1">
+                <a:alpha val="18000"/>
+              </a:schemeClr>
+            </a:solidFill>
+          </a:ln>
+        </p:spPr>
+        <p:style>
+          <a:lnRef idx="1">
+            <a:schemeClr val="accent1"/>
+          </a:lnRef>
+          <a:fillRef idx="0">
+            <a:schemeClr val="accent1"/>
+          </a:fillRef>
+          <a:effectRef idx="0">
+            <a:schemeClr val="accent1"/>
+          </a:effectRef>
+          <a:fontRef idx="minor">
+            <a:schemeClr val="tx1"/>
+          </a:fontRef>
+        </p:style>
+      </p:cxnSp>
     </p:spTree>
     <p:extLst>
       <p:ext uri="{BB962C8B-B14F-4D97-AF65-F5344CB8AC3E}">
-        <p14:creationId xmlns:p14="http://schemas.microsoft.com/office/powerpoint/2010/main" val="240194243"/>
+        <p14:creationId xmlns:p14="http://schemas.microsoft.com/office/powerpoint/2010/main" val="1797430089"/>
       </p:ext>
     </p:extLst>
   </p:cSld>
   <p:clrMapOvr>
     <a:masterClrMapping/>
   </p:clrMapOvr>
-  <p:timing>
-    <p:tnLst>
-      <p:par>
-        <p:cTn id="1" dur="indefinite" restart="never" nodeType="tmRoot"/>
-      </p:par>
-    </p:tnLst>
-  </p:timing>
 </p:sld>
 </file>
 
@@ -5336,7 +5330,7 @@
     </a:clrScheme>
     <a:fontScheme name="Office">
       <a:majorFont>
-        <a:latin typeface="Calibri Light" panose="020F0302020204030204"/>
+        <a:latin typeface="Calibri Light"/>
         <a:ea typeface=""/>
         <a:cs typeface=""/>
         <a:font script="Jpan" typeface="Yu Gothic Light"/>
@@ -5371,7 +5365,7 @@
         <a:font script="Geor" typeface="Sylfaen"/>
       </a:majorFont>
       <a:minorFont>
-        <a:latin typeface="Calibri" panose="020F0502020204030204"/>
+        <a:latin typeface="Calibri"/>
         <a:ea typeface=""/>
         <a:cs typeface=""/>
         <a:font script="Jpan" typeface="Yu Gothic"/>
@@ -5548,7 +5542,7 @@
   <a:extraClrSchemeLst/>
   <a:extLst>
     <a:ext uri="{05A4C25C-085E-4340-85A3-A5531E510DB2}">
-      <thm15:themeFamily xmlns:thm15="http://schemas.microsoft.com/office/thememl/2012/main" name="Office Theme" id="{62F939B6-93AF-4DB8-9C6B-D6C7DFDC589F}" vid="{4A3C46E8-61CC-4603-A589-7422A47A8E4A}"/>
+      <thm15:themeFamily xmlns:thm15="http://schemas.microsoft.com/office/thememl/2012/main" xmlns="" name="Office Theme" id="{62F939B6-93AF-4DB8-9C6B-D6C7DFDC589F}" vid="{4A3C46E8-61CC-4603-A589-7422A47A8E4A}"/>
     </a:ext>
   </a:extLst>
 </a:theme>
@@ -5597,7 +5591,7 @@
     </a:clrScheme>
     <a:fontScheme name="Office">
       <a:majorFont>
-        <a:latin typeface="Calibri Light" panose="020F0302020204030204"/>
+        <a:latin typeface="Calibri Light"/>
         <a:ea typeface=""/>
         <a:cs typeface=""/>
         <a:font script="Jpan" typeface="Yu Gothic Light"/>
@@ -5632,7 +5626,7 @@
         <a:font script="Geor" typeface="Sylfaen"/>
       </a:majorFont>
       <a:minorFont>
-        <a:latin typeface="Calibri" panose="020F0502020204030204"/>
+        <a:latin typeface="Calibri"/>
         <a:ea typeface=""/>
         <a:cs typeface=""/>
         <a:font script="Jpan" typeface="Yu Gothic"/>
@@ -5809,7 +5803,7 @@
   <a:extraClrSchemeLst/>
   <a:extLst>
     <a:ext uri="{05A4C25C-085E-4340-85A3-A5531E510DB2}">
-      <thm15:themeFamily xmlns:thm15="http://schemas.microsoft.com/office/thememl/2012/main" name="Office Theme" id="{62F939B6-93AF-4DB8-9C6B-D6C7DFDC589F}" vid="{4A3C46E8-61CC-4603-A589-7422A47A8E4A}"/>
+      <thm15:themeFamily xmlns:thm15="http://schemas.microsoft.com/office/thememl/2012/main" xmlns="" name="Office Theme" id="{62F939B6-93AF-4DB8-9C6B-D6C7DFDC589F}" vid="{4A3C46E8-61CC-4603-A589-7422A47A8E4A}"/>
     </a:ext>
   </a:extLst>
 </a:theme>

</xml_diff>